<commit_message>
#07-03 이세철 Client Chat 띄우기 완료
서버와 연동해야 함
</commit_message>
<xml_diff>
--- a/Client/PvE/REVENGER/UI/XDUI/UI.pptx
+++ b/Client/PvE/REVENGER/UI/XDUI/UI.pptx
@@ -263,7 +263,7 @@
           <a:p>
             <a:fld id="{E54CAA87-A1E0-4A2A-8255-07B10906445F}" type="datetimeFigureOut">
               <a:rPr lang="ko-KR" altLang="en-US" smtClean="0"/>
-              <a:t>2023-06-27</a:t>
+              <a:t>2023-07-03</a:t>
             </a:fld>
             <a:endParaRPr lang="ko-KR" altLang="en-US"/>
           </a:p>
@@ -461,7 +461,7 @@
           <a:p>
             <a:fld id="{E54CAA87-A1E0-4A2A-8255-07B10906445F}" type="datetimeFigureOut">
               <a:rPr lang="ko-KR" altLang="en-US" smtClean="0"/>
-              <a:t>2023-06-27</a:t>
+              <a:t>2023-07-03</a:t>
             </a:fld>
             <a:endParaRPr lang="ko-KR" altLang="en-US"/>
           </a:p>
@@ -669,7 +669,7 @@
           <a:p>
             <a:fld id="{E54CAA87-A1E0-4A2A-8255-07B10906445F}" type="datetimeFigureOut">
               <a:rPr lang="ko-KR" altLang="en-US" smtClean="0"/>
-              <a:t>2023-06-27</a:t>
+              <a:t>2023-07-03</a:t>
             </a:fld>
             <a:endParaRPr lang="ko-KR" altLang="en-US"/>
           </a:p>
@@ -867,7 +867,7 @@
           <a:p>
             <a:fld id="{E54CAA87-A1E0-4A2A-8255-07B10906445F}" type="datetimeFigureOut">
               <a:rPr lang="ko-KR" altLang="en-US" smtClean="0"/>
-              <a:t>2023-06-27</a:t>
+              <a:t>2023-07-03</a:t>
             </a:fld>
             <a:endParaRPr lang="ko-KR" altLang="en-US"/>
           </a:p>
@@ -1142,7 +1142,7 @@
           <a:p>
             <a:fld id="{E54CAA87-A1E0-4A2A-8255-07B10906445F}" type="datetimeFigureOut">
               <a:rPr lang="ko-KR" altLang="en-US" smtClean="0"/>
-              <a:t>2023-06-27</a:t>
+              <a:t>2023-07-03</a:t>
             </a:fld>
             <a:endParaRPr lang="ko-KR" altLang="en-US"/>
           </a:p>
@@ -1407,7 +1407,7 @@
           <a:p>
             <a:fld id="{E54CAA87-A1E0-4A2A-8255-07B10906445F}" type="datetimeFigureOut">
               <a:rPr lang="ko-KR" altLang="en-US" smtClean="0"/>
-              <a:t>2023-06-27</a:t>
+              <a:t>2023-07-03</a:t>
             </a:fld>
             <a:endParaRPr lang="ko-KR" altLang="en-US"/>
           </a:p>
@@ -1819,7 +1819,7 @@
           <a:p>
             <a:fld id="{E54CAA87-A1E0-4A2A-8255-07B10906445F}" type="datetimeFigureOut">
               <a:rPr lang="ko-KR" altLang="en-US" smtClean="0"/>
-              <a:t>2023-06-27</a:t>
+              <a:t>2023-07-03</a:t>
             </a:fld>
             <a:endParaRPr lang="ko-KR" altLang="en-US"/>
           </a:p>
@@ -1960,7 +1960,7 @@
           <a:p>
             <a:fld id="{E54CAA87-A1E0-4A2A-8255-07B10906445F}" type="datetimeFigureOut">
               <a:rPr lang="ko-KR" altLang="en-US" smtClean="0"/>
-              <a:t>2023-06-27</a:t>
+              <a:t>2023-07-03</a:t>
             </a:fld>
             <a:endParaRPr lang="ko-KR" altLang="en-US"/>
           </a:p>
@@ -2073,7 +2073,7 @@
           <a:p>
             <a:fld id="{E54CAA87-A1E0-4A2A-8255-07B10906445F}" type="datetimeFigureOut">
               <a:rPr lang="ko-KR" altLang="en-US" smtClean="0"/>
-              <a:t>2023-06-27</a:t>
+              <a:t>2023-07-03</a:t>
             </a:fld>
             <a:endParaRPr lang="ko-KR" altLang="en-US"/>
           </a:p>
@@ -2384,7 +2384,7 @@
           <a:p>
             <a:fld id="{E54CAA87-A1E0-4A2A-8255-07B10906445F}" type="datetimeFigureOut">
               <a:rPr lang="ko-KR" altLang="en-US" smtClean="0"/>
-              <a:t>2023-06-27</a:t>
+              <a:t>2023-07-03</a:t>
             </a:fld>
             <a:endParaRPr lang="ko-KR" altLang="en-US"/>
           </a:p>
@@ -2672,7 +2672,7 @@
           <a:p>
             <a:fld id="{E54CAA87-A1E0-4A2A-8255-07B10906445F}" type="datetimeFigureOut">
               <a:rPr lang="ko-KR" altLang="en-US" smtClean="0"/>
-              <a:t>2023-06-27</a:t>
+              <a:t>2023-07-03</a:t>
             </a:fld>
             <a:endParaRPr lang="ko-KR" altLang="en-US"/>
           </a:p>
@@ -2913,7 +2913,7 @@
           <a:p>
             <a:fld id="{E54CAA87-A1E0-4A2A-8255-07B10906445F}" type="datetimeFigureOut">
               <a:rPr lang="ko-KR" altLang="en-US" smtClean="0"/>
-              <a:t>2023-06-27</a:t>
+              <a:t>2023-07-03</a:t>
             </a:fld>
             <a:endParaRPr lang="ko-KR" altLang="en-US"/>
           </a:p>
@@ -7384,6 +7384,153 @@
           </a:p>
         </p:txBody>
       </p:sp>
+      <p:sp>
+        <p:nvSpPr>
+          <p:cNvPr id="7" name="직사각형 6">
+            <a:extLst>
+              <a:ext uri="{FF2B5EF4-FFF2-40B4-BE49-F238E27FC236}">
+                <a16:creationId xmlns:a16="http://schemas.microsoft.com/office/drawing/2014/main" id="{A901737B-201F-B8DC-1DD2-5028AA6F80D8}"/>
+              </a:ext>
+            </a:extLst>
+          </p:cNvPr>
+          <p:cNvSpPr/>
+          <p:nvPr/>
+        </p:nvSpPr>
+        <p:spPr>
+          <a:xfrm>
+            <a:off x="7422592" y="2876370"/>
+            <a:ext cx="4769408" cy="1771997"/>
+          </a:xfrm>
+          <a:prstGeom prst="rect">
+            <a:avLst/>
+          </a:prstGeom>
+          <a:solidFill>
+            <a:schemeClr val="tx1">
+              <a:lumMod val="75000"/>
+              <a:lumOff val="25000"/>
+              <a:alpha val="65000"/>
+            </a:schemeClr>
+          </a:solidFill>
+          <a:ln>
+            <a:noFill/>
+          </a:ln>
+        </p:spPr>
+        <p:style>
+          <a:lnRef idx="2">
+            <a:schemeClr val="accent1">
+              <a:shade val="15000"/>
+            </a:schemeClr>
+          </a:lnRef>
+          <a:fillRef idx="1">
+            <a:schemeClr val="accent1"/>
+          </a:fillRef>
+          <a:effectRef idx="0">
+            <a:schemeClr val="accent1"/>
+          </a:effectRef>
+          <a:fontRef idx="minor">
+            <a:schemeClr val="lt1"/>
+          </a:fontRef>
+        </p:style>
+        <p:txBody>
+          <a:bodyPr rtlCol="0" anchor="ctr"/>
+          <a:lstStyle/>
+          <a:p>
+            <a:pPr algn="ctr"/>
+            <a:endParaRPr lang="ko-KR" altLang="en-US"/>
+          </a:p>
+        </p:txBody>
+      </p:sp>
+      <p:pic>
+        <p:nvPicPr>
+          <p:cNvPr id="9" name="그림 8">
+            <a:extLst>
+              <a:ext uri="{FF2B5EF4-FFF2-40B4-BE49-F238E27FC236}">
+                <a16:creationId xmlns:a16="http://schemas.microsoft.com/office/drawing/2014/main" id="{20ED4252-F754-B125-34D3-4782F944F471}"/>
+              </a:ext>
+            </a:extLst>
+          </p:cNvPr>
+          <p:cNvPicPr>
+            <a:picLocks noChangeAspect="1"/>
+          </p:cNvPicPr>
+          <p:nvPr/>
+        </p:nvPicPr>
+        <p:blipFill>
+          <a:blip r:embed="rId9">
+            <a:extLst>
+              <a:ext uri="{28A0092B-C50C-407E-A947-70E740481C1C}">
+                <a14:useLocalDpi xmlns:a14="http://schemas.microsoft.com/office/drawing/2010/main" val="0"/>
+              </a:ext>
+            </a:extLst>
+          </a:blip>
+          <a:stretch>
+            <a:fillRect/>
+          </a:stretch>
+        </p:blipFill>
+        <p:spPr>
+          <a:xfrm>
+            <a:off x="1659329" y="0"/>
+            <a:ext cx="9043390" cy="6858000"/>
+          </a:xfrm>
+          <a:prstGeom prst="rect">
+            <a:avLst/>
+          </a:prstGeom>
+        </p:spPr>
+      </p:pic>
+      <p:sp>
+        <p:nvSpPr>
+          <p:cNvPr id="11" name="직사각형 10">
+            <a:extLst>
+              <a:ext uri="{FF2B5EF4-FFF2-40B4-BE49-F238E27FC236}">
+                <a16:creationId xmlns:a16="http://schemas.microsoft.com/office/drawing/2014/main" id="{99A76A8F-90E3-E51E-9454-5C56BEF540D8}"/>
+              </a:ext>
+            </a:extLst>
+          </p:cNvPr>
+          <p:cNvSpPr/>
+          <p:nvPr/>
+        </p:nvSpPr>
+        <p:spPr>
+          <a:xfrm>
+            <a:off x="7422577" y="4668950"/>
+            <a:ext cx="4769408" cy="420275"/>
+          </a:xfrm>
+          <a:prstGeom prst="rect">
+            <a:avLst/>
+          </a:prstGeom>
+          <a:solidFill>
+            <a:schemeClr val="tx1">
+              <a:lumMod val="75000"/>
+              <a:lumOff val="25000"/>
+            </a:schemeClr>
+          </a:solidFill>
+          <a:ln>
+            <a:noFill/>
+          </a:ln>
+        </p:spPr>
+        <p:style>
+          <a:lnRef idx="2">
+            <a:schemeClr val="accent1">
+              <a:shade val="15000"/>
+            </a:schemeClr>
+          </a:lnRef>
+          <a:fillRef idx="1">
+            <a:schemeClr val="accent1"/>
+          </a:fillRef>
+          <a:effectRef idx="0">
+            <a:schemeClr val="accent1"/>
+          </a:effectRef>
+          <a:fontRef idx="minor">
+            <a:schemeClr val="lt1"/>
+          </a:fontRef>
+        </p:style>
+        <p:txBody>
+          <a:bodyPr rtlCol="0" anchor="ctr"/>
+          <a:lstStyle/>
+          <a:p>
+            <a:pPr algn="ctr"/>
+            <a:endParaRPr lang="ko-KR" altLang="en-US"/>
+          </a:p>
+        </p:txBody>
+      </p:sp>
     </p:spTree>
     <p:extLst>
       <p:ext uri="{BB962C8B-B14F-4D97-AF65-F5344CB8AC3E}">

</xml_diff>

<commit_message>
#07-14 이세철 Lobby UI 수정
</commit_message>
<xml_diff>
--- a/Client/PvE/REVENGER/UI/XDUI/UI.pptx
+++ b/Client/PvE/REVENGER/UI/XDUI/UI.pptx
@@ -9104,369 +9104,366 @@
           </a:prstGeom>
         </p:spPr>
       </p:pic>
-      <p:grpSp>
-        <p:nvGrpSpPr>
-          <p:cNvPr id="1130" name="그룹 1129">
+      <p:sp>
+        <p:nvSpPr>
+          <p:cNvPr id="1131" name="직사각형 1130">
             <a:extLst>
               <a:ext uri="{FF2B5EF4-FFF2-40B4-BE49-F238E27FC236}">
-                <a16:creationId xmlns:a16="http://schemas.microsoft.com/office/drawing/2014/main" id="{4F015BF9-0B01-1935-0BA6-B376147979C1}"/>
+                <a16:creationId xmlns:a16="http://schemas.microsoft.com/office/drawing/2014/main" id="{634241B0-4C5A-3886-93E8-715E14A9BB71}"/>
               </a:ext>
             </a:extLst>
           </p:cNvPr>
-          <p:cNvGrpSpPr/>
+          <p:cNvSpPr/>
           <p:nvPr/>
-        </p:nvGrpSpPr>
-        <p:grpSpPr>
+        </p:nvSpPr>
+        <p:spPr>
           <a:xfrm>
-            <a:off x="1983324" y="1056388"/>
-            <a:ext cx="8225352" cy="4744070"/>
-            <a:chOff x="1983324" y="1056388"/>
-            <a:chExt cx="8225352" cy="4744070"/>
+            <a:off x="1983324" y="1056387"/>
+            <a:ext cx="8225352" cy="4944363"/>
           </a:xfrm>
-        </p:grpSpPr>
-        <p:sp>
-          <p:nvSpPr>
-            <p:cNvPr id="1131" name="직사각형 1130">
-              <a:extLst>
-                <a:ext uri="{FF2B5EF4-FFF2-40B4-BE49-F238E27FC236}">
-                  <a16:creationId xmlns:a16="http://schemas.microsoft.com/office/drawing/2014/main" id="{634241B0-4C5A-3886-93E8-715E14A9BB71}"/>
-                </a:ext>
-              </a:extLst>
-            </p:cNvPr>
-            <p:cNvSpPr/>
-            <p:nvPr/>
-          </p:nvSpPr>
-          <p:spPr>
-            <a:xfrm>
-              <a:off x="1983324" y="1056388"/>
-              <a:ext cx="8225352" cy="4744070"/>
-            </a:xfrm>
-            <a:prstGeom prst="rect">
-              <a:avLst/>
-            </a:prstGeom>
+          <a:prstGeom prst="rect">
+            <a:avLst/>
+          </a:prstGeom>
+          <a:solidFill>
+            <a:schemeClr val="tx1"/>
+          </a:solidFill>
+          <a:ln w="19050">
             <a:solidFill>
-              <a:schemeClr val="tx1"/>
+              <a:srgbClr val="F6DEAA"/>
             </a:solidFill>
-            <a:ln w="19050">
-              <a:solidFill>
-                <a:srgbClr val="F6DEAA"/>
-              </a:solidFill>
-            </a:ln>
-          </p:spPr>
-          <p:style>
-            <a:lnRef idx="2">
-              <a:schemeClr val="accent1">
-                <a:shade val="15000"/>
+          </a:ln>
+        </p:spPr>
+        <p:style>
+          <a:lnRef idx="2">
+            <a:schemeClr val="accent1">
+              <a:shade val="15000"/>
+            </a:schemeClr>
+          </a:lnRef>
+          <a:fillRef idx="1">
+            <a:schemeClr val="accent1"/>
+          </a:fillRef>
+          <a:effectRef idx="0">
+            <a:schemeClr val="accent1"/>
+          </a:effectRef>
+          <a:fontRef idx="minor">
+            <a:schemeClr val="lt1"/>
+          </a:fontRef>
+        </p:style>
+        <p:txBody>
+          <a:bodyPr rtlCol="0" anchor="ctr"/>
+          <a:lstStyle/>
+          <a:p>
+            <a:pPr algn="ctr"/>
+            <a:endParaRPr lang="ko-KR" altLang="en-US" dirty="0"/>
+          </a:p>
+        </p:txBody>
+      </p:sp>
+      <p:sp>
+        <p:nvSpPr>
+          <p:cNvPr id="1132" name="사각형: 둥근 모서리 1131">
+            <a:extLst>
+              <a:ext uri="{FF2B5EF4-FFF2-40B4-BE49-F238E27FC236}">
+                <a16:creationId xmlns:a16="http://schemas.microsoft.com/office/drawing/2014/main" id="{544C04D1-C1D9-5232-6F12-419A383C9A92}"/>
+              </a:ext>
+            </a:extLst>
+          </p:cNvPr>
+          <p:cNvSpPr/>
+          <p:nvPr/>
+        </p:nvSpPr>
+        <p:spPr>
+          <a:xfrm>
+            <a:off x="8529997" y="-655788"/>
+            <a:ext cx="1552575" cy="590550"/>
+          </a:xfrm>
+          <a:prstGeom prst="roundRect">
+            <a:avLst/>
+          </a:prstGeom>
+          <a:noFill/>
+          <a:ln w="38100">
+            <a:solidFill>
+              <a:schemeClr val="bg1"/>
+            </a:solidFill>
+          </a:ln>
+        </p:spPr>
+        <p:style>
+          <a:lnRef idx="2">
+            <a:schemeClr val="accent1">
+              <a:shade val="15000"/>
+            </a:schemeClr>
+          </a:lnRef>
+          <a:fillRef idx="1">
+            <a:schemeClr val="accent1"/>
+          </a:fillRef>
+          <a:effectRef idx="0">
+            <a:schemeClr val="accent1"/>
+          </a:effectRef>
+          <a:fontRef idx="minor">
+            <a:schemeClr val="lt1"/>
+          </a:fontRef>
+        </p:style>
+        <p:txBody>
+          <a:bodyPr lIns="0" tIns="0" rIns="0" bIns="0" rtlCol="0" anchor="ctr"/>
+          <a:lstStyle/>
+          <a:p>
+            <a:pPr algn="ctr"/>
+            <a:r>
+              <a:rPr lang="ko-KR" altLang="en-US" sz="1600" dirty="0">
+                <a:latin typeface="나눔스퀘어 Bold" panose="020B0600000101010101" pitchFamily="50" charset="-127"/>
+                <a:ea typeface="나눔스퀘어 Bold" panose="020B0600000101010101" pitchFamily="50" charset="-127"/>
+              </a:rPr>
+              <a:t>방 만들기</a:t>
+            </a:r>
+          </a:p>
+        </p:txBody>
+      </p:sp>
+      <p:sp>
+        <p:nvSpPr>
+          <p:cNvPr id="1133" name="사각형: 둥근 모서리 1132">
+            <a:extLst>
+              <a:ext uri="{FF2B5EF4-FFF2-40B4-BE49-F238E27FC236}">
+                <a16:creationId xmlns:a16="http://schemas.microsoft.com/office/drawing/2014/main" id="{D235587F-621B-83BF-953E-32F984C6E09D}"/>
+              </a:ext>
+            </a:extLst>
+          </p:cNvPr>
+          <p:cNvSpPr/>
+          <p:nvPr/>
+        </p:nvSpPr>
+        <p:spPr>
+          <a:xfrm>
+            <a:off x="10520049" y="-1281346"/>
+            <a:ext cx="1552575" cy="590550"/>
+          </a:xfrm>
+          <a:prstGeom prst="roundRect">
+            <a:avLst/>
+          </a:prstGeom>
+          <a:noFill/>
+          <a:ln w="38100">
+            <a:solidFill>
+              <a:schemeClr val="tx2">
+                <a:lumMod val="60000"/>
+                <a:lumOff val="40000"/>
               </a:schemeClr>
-            </a:lnRef>
-            <a:fillRef idx="1">
-              <a:schemeClr val="accent1"/>
-            </a:fillRef>
-            <a:effectRef idx="0">
-              <a:schemeClr val="accent1"/>
-            </a:effectRef>
-            <a:fontRef idx="minor">
-              <a:schemeClr val="lt1"/>
-            </a:fontRef>
-          </p:style>
-          <p:txBody>
-            <a:bodyPr rtlCol="0" anchor="ctr"/>
-            <a:lstStyle/>
-            <a:p>
-              <a:pPr algn="ctr"/>
-              <a:endParaRPr lang="ko-KR" altLang="en-US" dirty="0"/>
-            </a:p>
-          </p:txBody>
-        </p:sp>
-        <p:sp>
-          <p:nvSpPr>
-            <p:cNvPr id="1132" name="사각형: 둥근 모서리 1131">
-              <a:extLst>
-                <a:ext uri="{FF2B5EF4-FFF2-40B4-BE49-F238E27FC236}">
-                  <a16:creationId xmlns:a16="http://schemas.microsoft.com/office/drawing/2014/main" id="{544C04D1-C1D9-5232-6F12-419A383C9A92}"/>
-                </a:ext>
-              </a:extLst>
-            </p:cNvPr>
-            <p:cNvSpPr/>
-            <p:nvPr/>
-          </p:nvSpPr>
-          <p:spPr>
-            <a:xfrm>
-              <a:off x="8331422" y="1352550"/>
-              <a:ext cx="1552575" cy="590550"/>
-            </a:xfrm>
-            <a:prstGeom prst="roundRect">
-              <a:avLst/>
-            </a:prstGeom>
-            <a:noFill/>
-            <a:ln w="38100">
-              <a:solidFill>
-                <a:schemeClr val="bg1"/>
-              </a:solidFill>
-            </a:ln>
-          </p:spPr>
-          <p:style>
-            <a:lnRef idx="2">
-              <a:schemeClr val="accent1">
-                <a:shade val="15000"/>
-              </a:schemeClr>
-            </a:lnRef>
-            <a:fillRef idx="1">
-              <a:schemeClr val="accent1"/>
-            </a:fillRef>
-            <a:effectRef idx="0">
-              <a:schemeClr val="accent1"/>
-            </a:effectRef>
-            <a:fontRef idx="minor">
-              <a:schemeClr val="lt1"/>
-            </a:fontRef>
-          </p:style>
-          <p:txBody>
-            <a:bodyPr lIns="0" tIns="0" rIns="0" bIns="0" rtlCol="0" anchor="ctr"/>
-            <a:lstStyle/>
-            <a:p>
-              <a:pPr algn="ctr"/>
-              <a:r>
-                <a:rPr lang="ko-KR" altLang="en-US" sz="1600" dirty="0">
-                  <a:latin typeface="나눔스퀘어 Bold" panose="020B0600000101010101" pitchFamily="50" charset="-127"/>
-                  <a:ea typeface="나눔스퀘어 Bold" panose="020B0600000101010101" pitchFamily="50" charset="-127"/>
-                </a:rPr>
-                <a:t>방 만들기</a:t>
-              </a:r>
-            </a:p>
-          </p:txBody>
-        </p:sp>
-        <p:sp>
-          <p:nvSpPr>
-            <p:cNvPr id="1133" name="사각형: 둥근 모서리 1132">
-              <a:extLst>
-                <a:ext uri="{FF2B5EF4-FFF2-40B4-BE49-F238E27FC236}">
-                  <a16:creationId xmlns:a16="http://schemas.microsoft.com/office/drawing/2014/main" id="{D235587F-621B-83BF-953E-32F984C6E09D}"/>
-                </a:ext>
-              </a:extLst>
-            </p:cNvPr>
-            <p:cNvSpPr/>
-            <p:nvPr/>
-          </p:nvSpPr>
-          <p:spPr>
-            <a:xfrm>
-              <a:off x="6317865" y="1352550"/>
-              <a:ext cx="1552575" cy="590550"/>
-            </a:xfrm>
-            <a:prstGeom prst="roundRect">
-              <a:avLst/>
-            </a:prstGeom>
-            <a:noFill/>
-            <a:ln w="38100">
-              <a:solidFill>
-                <a:srgbClr val="6CA7BC"/>
-              </a:solidFill>
-            </a:ln>
-          </p:spPr>
-          <p:style>
-            <a:lnRef idx="2">
-              <a:schemeClr val="accent1">
-                <a:shade val="15000"/>
-              </a:schemeClr>
-            </a:lnRef>
-            <a:fillRef idx="1">
-              <a:schemeClr val="accent1"/>
-            </a:fillRef>
-            <a:effectRef idx="0">
-              <a:schemeClr val="accent1"/>
-            </a:effectRef>
-            <a:fontRef idx="minor">
-              <a:schemeClr val="lt1"/>
-            </a:fontRef>
-          </p:style>
-          <p:txBody>
-            <a:bodyPr lIns="0" tIns="0" rIns="0" bIns="0" rtlCol="0" anchor="ctr"/>
-            <a:lstStyle/>
-            <a:p>
-              <a:pPr algn="ctr"/>
-              <a:r>
-                <a:rPr lang="ko-KR" altLang="en-US" sz="1600" spc="-300" dirty="0">
-                  <a:solidFill>
-                    <a:srgbClr val="6CA7BC"/>
-                  </a:solidFill>
-                  <a:latin typeface="나눔스퀘어 Bold" panose="020B0600000101010101" pitchFamily="50" charset="-127"/>
-                  <a:ea typeface="나눔스퀘어 Bold" panose="020B0600000101010101" pitchFamily="50" charset="-127"/>
-                </a:rPr>
-                <a:t>▶▶</a:t>
-              </a:r>
-              <a:r>
-                <a:rPr lang="ko-KR" altLang="en-US" sz="1600" dirty="0">
-                  <a:solidFill>
-                    <a:srgbClr val="6CA7BC"/>
-                  </a:solidFill>
-                  <a:latin typeface="나눔스퀘어 Bold" panose="020B0600000101010101" pitchFamily="50" charset="-127"/>
-                  <a:ea typeface="나눔스퀘어 Bold" panose="020B0600000101010101" pitchFamily="50" charset="-127"/>
-                </a:rPr>
-                <a:t> </a:t>
-              </a:r>
-              <a:r>
-                <a:rPr lang="ko-KR" altLang="en-US" sz="1600" spc="-300" dirty="0">
-                  <a:solidFill>
-                    <a:srgbClr val="6CA7BC"/>
-                  </a:solidFill>
-                  <a:latin typeface="나눔스퀘어 Bold" panose="020B0600000101010101" pitchFamily="50" charset="-127"/>
-                  <a:ea typeface="나눔스퀘어 Bold" panose="020B0600000101010101" pitchFamily="50" charset="-127"/>
-                </a:rPr>
-                <a:t> </a:t>
-              </a:r>
-              <a:r>
-                <a:rPr lang="ko-KR" altLang="en-US" sz="1600" dirty="0">
-                  <a:solidFill>
-                    <a:srgbClr val="6CA7BC"/>
-                  </a:solidFill>
-                  <a:latin typeface="나눔스퀘어 Bold" panose="020B0600000101010101" pitchFamily="50" charset="-127"/>
-                  <a:ea typeface="나눔스퀘어 Bold" panose="020B0600000101010101" pitchFamily="50" charset="-127"/>
-                </a:rPr>
-                <a:t>빠른 시작</a:t>
-              </a:r>
-              <a:endParaRPr lang="ko-KR" altLang="en-US" sz="1600" spc="-300" dirty="0">
+            </a:solidFill>
+          </a:ln>
+        </p:spPr>
+        <p:style>
+          <a:lnRef idx="2">
+            <a:schemeClr val="accent1">
+              <a:shade val="15000"/>
+            </a:schemeClr>
+          </a:lnRef>
+          <a:fillRef idx="1">
+            <a:schemeClr val="accent1"/>
+          </a:fillRef>
+          <a:effectRef idx="0">
+            <a:schemeClr val="accent1"/>
+          </a:effectRef>
+          <a:fontRef idx="minor">
+            <a:schemeClr val="lt1"/>
+          </a:fontRef>
+        </p:style>
+        <p:txBody>
+          <a:bodyPr lIns="0" tIns="0" rIns="0" bIns="0" rtlCol="0" anchor="ctr"/>
+          <a:lstStyle/>
+          <a:p>
+            <a:pPr algn="ctr"/>
+            <a:r>
+              <a:rPr lang="ko-KR" altLang="en-US" sz="1600" spc="-300" dirty="0">
                 <a:solidFill>
-                  <a:srgbClr val="6CA7BC"/>
+                  <a:schemeClr val="tx2">
+                    <a:lumMod val="60000"/>
+                    <a:lumOff val="40000"/>
+                  </a:schemeClr>
                 </a:solidFill>
                 <a:latin typeface="나눔스퀘어 Bold" panose="020B0600000101010101" pitchFamily="50" charset="-127"/>
                 <a:ea typeface="나눔스퀘어 Bold" panose="020B0600000101010101" pitchFamily="50" charset="-127"/>
-              </a:endParaRPr>
-            </a:p>
-          </p:txBody>
-        </p:sp>
-        <p:sp>
-          <p:nvSpPr>
-            <p:cNvPr id="1134" name="사각형: 둥근 모서리 1133">
-              <a:extLst>
-                <a:ext uri="{FF2B5EF4-FFF2-40B4-BE49-F238E27FC236}">
-                  <a16:creationId xmlns:a16="http://schemas.microsoft.com/office/drawing/2014/main" id="{8EC69654-6182-7E70-8C68-F2716642B784}"/>
-                </a:ext>
-              </a:extLst>
-            </p:cNvPr>
-            <p:cNvSpPr/>
-            <p:nvPr/>
-          </p:nvSpPr>
-          <p:spPr>
-            <a:xfrm>
-              <a:off x="2082274" y="1395070"/>
-              <a:ext cx="1552575" cy="590550"/>
-            </a:xfrm>
-            <a:prstGeom prst="roundRect">
-              <a:avLst/>
-            </a:prstGeom>
+              </a:rPr>
+              <a:t>▶▶</a:t>
+            </a:r>
+            <a:r>
+              <a:rPr lang="ko-KR" altLang="en-US" sz="1600" dirty="0">
+                <a:solidFill>
+                  <a:schemeClr val="tx2">
+                    <a:lumMod val="60000"/>
+                    <a:lumOff val="40000"/>
+                  </a:schemeClr>
+                </a:solidFill>
+                <a:latin typeface="나눔스퀘어 Bold" panose="020B0600000101010101" pitchFamily="50" charset="-127"/>
+                <a:ea typeface="나눔스퀘어 Bold" panose="020B0600000101010101" pitchFamily="50" charset="-127"/>
+              </a:rPr>
+              <a:t> </a:t>
+            </a:r>
+            <a:r>
+              <a:rPr lang="ko-KR" altLang="en-US" sz="1600" spc="-300" dirty="0">
+                <a:solidFill>
+                  <a:schemeClr val="tx2">
+                    <a:lumMod val="60000"/>
+                    <a:lumOff val="40000"/>
+                  </a:schemeClr>
+                </a:solidFill>
+                <a:latin typeface="나눔스퀘어 Bold" panose="020B0600000101010101" pitchFamily="50" charset="-127"/>
+                <a:ea typeface="나눔스퀘어 Bold" panose="020B0600000101010101" pitchFamily="50" charset="-127"/>
+              </a:rPr>
+              <a:t> </a:t>
+            </a:r>
+            <a:r>
+              <a:rPr lang="ko-KR" altLang="en-US" sz="1600" dirty="0">
+                <a:solidFill>
+                  <a:schemeClr val="tx2">
+                    <a:lumMod val="60000"/>
+                    <a:lumOff val="40000"/>
+                  </a:schemeClr>
+                </a:solidFill>
+                <a:latin typeface="나눔스퀘어 Bold" panose="020B0600000101010101" pitchFamily="50" charset="-127"/>
+                <a:ea typeface="나눔스퀘어 Bold" panose="020B0600000101010101" pitchFamily="50" charset="-127"/>
+              </a:rPr>
+              <a:t>빠른 시작</a:t>
+            </a:r>
+            <a:endParaRPr lang="ko-KR" altLang="en-US" sz="1600" spc="-300" dirty="0">
+              <a:solidFill>
+                <a:schemeClr val="tx2">
+                  <a:lumMod val="60000"/>
+                  <a:lumOff val="40000"/>
+                </a:schemeClr>
+              </a:solidFill>
+              <a:latin typeface="나눔스퀘어 Bold" panose="020B0600000101010101" pitchFamily="50" charset="-127"/>
+              <a:ea typeface="나눔스퀘어 Bold" panose="020B0600000101010101" pitchFamily="50" charset="-127"/>
+            </a:endParaRPr>
+          </a:p>
+        </p:txBody>
+      </p:sp>
+      <p:sp>
+        <p:nvSpPr>
+          <p:cNvPr id="1134" name="사각형: 둥근 모서리 1133">
+            <a:extLst>
+              <a:ext uri="{FF2B5EF4-FFF2-40B4-BE49-F238E27FC236}">
+                <a16:creationId xmlns:a16="http://schemas.microsoft.com/office/drawing/2014/main" id="{8EC69654-6182-7E70-8C68-F2716642B784}"/>
+              </a:ext>
+            </a:extLst>
+          </p:cNvPr>
+          <p:cNvSpPr/>
+          <p:nvPr/>
+        </p:nvSpPr>
+        <p:spPr>
+          <a:xfrm>
+            <a:off x="2082274" y="1395070"/>
+            <a:ext cx="1552575" cy="590550"/>
+          </a:xfrm>
+          <a:prstGeom prst="roundRect">
+            <a:avLst/>
+          </a:prstGeom>
+          <a:noFill/>
+          <a:ln>
             <a:noFill/>
-            <a:ln>
-              <a:noFill/>
-            </a:ln>
-          </p:spPr>
-          <p:style>
-            <a:lnRef idx="2">
-              <a:schemeClr val="accent1">
-                <a:shade val="15000"/>
-              </a:schemeClr>
-            </a:lnRef>
-            <a:fillRef idx="1">
-              <a:schemeClr val="accent1"/>
-            </a:fillRef>
-            <a:effectRef idx="0">
-              <a:schemeClr val="accent1"/>
-            </a:effectRef>
-            <a:fontRef idx="minor">
-              <a:schemeClr val="lt1"/>
-            </a:fontRef>
-          </p:style>
-          <p:txBody>
-            <a:bodyPr rtlCol="0" anchor="ctr"/>
-            <a:lstStyle/>
-            <a:p>
-              <a:pPr algn="ctr"/>
-              <a:r>
-                <a:rPr lang="en-US" altLang="ko-KR" sz="4000" dirty="0">
-                  <a:solidFill>
-                    <a:schemeClr val="bg1"/>
-                  </a:solidFill>
-                  <a:latin typeface="DS-Digital" pitchFamily="2" charset="0"/>
-                  <a:ea typeface="나눔스퀘어 ExtraBold" panose="020B0600000101010101" pitchFamily="50" charset="-127"/>
-                </a:rPr>
-                <a:t>LOBBY</a:t>
-              </a:r>
-              <a:endParaRPr lang="ko-KR" altLang="en-US" sz="4000" dirty="0">
+          </a:ln>
+        </p:spPr>
+        <p:style>
+          <a:lnRef idx="2">
+            <a:schemeClr val="accent1">
+              <a:shade val="15000"/>
+            </a:schemeClr>
+          </a:lnRef>
+          <a:fillRef idx="1">
+            <a:schemeClr val="accent1"/>
+          </a:fillRef>
+          <a:effectRef idx="0">
+            <a:schemeClr val="accent1"/>
+          </a:effectRef>
+          <a:fontRef idx="minor">
+            <a:schemeClr val="lt1"/>
+          </a:fontRef>
+        </p:style>
+        <p:txBody>
+          <a:bodyPr rtlCol="0" anchor="ctr"/>
+          <a:lstStyle/>
+          <a:p>
+            <a:pPr algn="ctr"/>
+            <a:r>
+              <a:rPr lang="en-US" altLang="ko-KR" sz="4000" dirty="0">
                 <a:solidFill>
                   <a:schemeClr val="bg1"/>
                 </a:solidFill>
                 <a:latin typeface="DS-Digital" pitchFamily="2" charset="0"/>
                 <a:ea typeface="나눔스퀘어 ExtraBold" panose="020B0600000101010101" pitchFamily="50" charset="-127"/>
-              </a:endParaRPr>
-            </a:p>
-          </p:txBody>
-        </p:sp>
-        <p:sp>
-          <p:nvSpPr>
-            <p:cNvPr id="1135" name="사각형: 둥근 모서리 1134">
-              <a:extLst>
-                <a:ext uri="{FF2B5EF4-FFF2-40B4-BE49-F238E27FC236}">
-                  <a16:creationId xmlns:a16="http://schemas.microsoft.com/office/drawing/2014/main" id="{4773F345-D1F1-E2BA-AAD6-22D4BABD04B1}"/>
-                </a:ext>
-              </a:extLst>
-            </p:cNvPr>
-            <p:cNvSpPr/>
-            <p:nvPr/>
-          </p:nvSpPr>
-          <p:spPr>
-            <a:xfrm>
-              <a:off x="2084605" y="1099283"/>
-              <a:ext cx="1211046" cy="362206"/>
-            </a:xfrm>
-            <a:prstGeom prst="roundRect">
-              <a:avLst/>
-            </a:prstGeom>
+              </a:rPr>
+              <a:t>LOBBY</a:t>
+            </a:r>
+            <a:endParaRPr lang="ko-KR" altLang="en-US" sz="4000" dirty="0">
+              <a:solidFill>
+                <a:schemeClr val="bg1"/>
+              </a:solidFill>
+              <a:latin typeface="DS-Digital" pitchFamily="2" charset="0"/>
+              <a:ea typeface="나눔스퀘어 ExtraBold" panose="020B0600000101010101" pitchFamily="50" charset="-127"/>
+            </a:endParaRPr>
+          </a:p>
+        </p:txBody>
+      </p:sp>
+      <p:sp>
+        <p:nvSpPr>
+          <p:cNvPr id="1135" name="사각형: 둥근 모서리 1134">
+            <a:extLst>
+              <a:ext uri="{FF2B5EF4-FFF2-40B4-BE49-F238E27FC236}">
+                <a16:creationId xmlns:a16="http://schemas.microsoft.com/office/drawing/2014/main" id="{4773F345-D1F1-E2BA-AAD6-22D4BABD04B1}"/>
+              </a:ext>
+            </a:extLst>
+          </p:cNvPr>
+          <p:cNvSpPr/>
+          <p:nvPr/>
+        </p:nvSpPr>
+        <p:spPr>
+          <a:xfrm>
+            <a:off x="2084605" y="1099283"/>
+            <a:ext cx="1211046" cy="362206"/>
+          </a:xfrm>
+          <a:prstGeom prst="roundRect">
+            <a:avLst/>
+          </a:prstGeom>
+          <a:noFill/>
+          <a:ln>
             <a:noFill/>
-            <a:ln>
-              <a:noFill/>
-            </a:ln>
-          </p:spPr>
-          <p:style>
-            <a:lnRef idx="2">
-              <a:schemeClr val="accent1">
-                <a:shade val="15000"/>
-              </a:schemeClr>
-            </a:lnRef>
-            <a:fillRef idx="1">
-              <a:schemeClr val="accent1"/>
-            </a:fillRef>
-            <a:effectRef idx="0">
-              <a:schemeClr val="accent1"/>
-            </a:effectRef>
-            <a:fontRef idx="minor">
-              <a:schemeClr val="lt1"/>
-            </a:fontRef>
-          </p:style>
-          <p:txBody>
-            <a:bodyPr rtlCol="0" anchor="ctr"/>
-            <a:lstStyle/>
-            <a:p>
-              <a:pPr algn="ctr"/>
-              <a:r>
-                <a:rPr lang="en-US" altLang="ko-KR" sz="1400" dirty="0">
-                  <a:solidFill>
-                    <a:srgbClr val="325D6D"/>
-                  </a:solidFill>
-                  <a:latin typeface="나눔스퀘어 ExtraBold" panose="020B0600000101010101" pitchFamily="50" charset="-127"/>
-                  <a:ea typeface="나눔스퀘어 ExtraBold" panose="020B0600000101010101" pitchFamily="50" charset="-127"/>
-                </a:rPr>
-                <a:t>REVENGER</a:t>
-              </a:r>
-              <a:endParaRPr lang="ko-KR" altLang="en-US" sz="1400" dirty="0">
+          </a:ln>
+        </p:spPr>
+        <p:style>
+          <a:lnRef idx="2">
+            <a:schemeClr val="accent1">
+              <a:shade val="15000"/>
+            </a:schemeClr>
+          </a:lnRef>
+          <a:fillRef idx="1">
+            <a:schemeClr val="accent1"/>
+          </a:fillRef>
+          <a:effectRef idx="0">
+            <a:schemeClr val="accent1"/>
+          </a:effectRef>
+          <a:fontRef idx="minor">
+            <a:schemeClr val="lt1"/>
+          </a:fontRef>
+        </p:style>
+        <p:txBody>
+          <a:bodyPr rtlCol="0" anchor="ctr"/>
+          <a:lstStyle/>
+          <a:p>
+            <a:pPr algn="ctr"/>
+            <a:r>
+              <a:rPr lang="en-US" altLang="ko-KR" sz="1400" dirty="0">
                 <a:solidFill>
                   <a:srgbClr val="325D6D"/>
                 </a:solidFill>
                 <a:latin typeface="나눔스퀘어 ExtraBold" panose="020B0600000101010101" pitchFamily="50" charset="-127"/>
                 <a:ea typeface="나눔스퀘어 ExtraBold" panose="020B0600000101010101" pitchFamily="50" charset="-127"/>
-              </a:endParaRPr>
-            </a:p>
-          </p:txBody>
-        </p:sp>
-      </p:grpSp>
+              </a:rPr>
+              <a:t>REVENGER</a:t>
+            </a:r>
+            <a:endParaRPr lang="ko-KR" altLang="en-US" sz="1400" dirty="0">
+              <a:solidFill>
+                <a:srgbClr val="325D6D"/>
+              </a:solidFill>
+              <a:latin typeface="나눔스퀘어 ExtraBold" panose="020B0600000101010101" pitchFamily="50" charset="-127"/>
+              <a:ea typeface="나눔스퀘어 ExtraBold" panose="020B0600000101010101" pitchFamily="50" charset="-127"/>
+            </a:endParaRPr>
+          </a:p>
+        </p:txBody>
+      </p:sp>
       <p:graphicFrame>
         <p:nvGraphicFramePr>
           <p:cNvPr id="1124" name="표 1124">
@@ -11696,7 +11693,7 @@
         </p:nvSpPr>
         <p:spPr>
           <a:xfrm>
-            <a:off x="7616633" y="2596465"/>
+            <a:off x="12359688" y="-334132"/>
             <a:ext cx="914400" cy="305719"/>
           </a:xfrm>
           <a:prstGeom prst="rect">
@@ -11754,7 +11751,7 @@
         </p:nvSpPr>
         <p:spPr>
           <a:xfrm>
-            <a:off x="7616633" y="2972376"/>
+            <a:off x="12359688" y="41779"/>
             <a:ext cx="914400" cy="305719"/>
           </a:xfrm>
           <a:prstGeom prst="rect">
@@ -11812,7 +11809,7 @@
         </p:nvSpPr>
         <p:spPr>
           <a:xfrm>
-            <a:off x="7616633" y="3342614"/>
+            <a:off x="12359688" y="412017"/>
             <a:ext cx="914400" cy="305719"/>
           </a:xfrm>
           <a:prstGeom prst="rect">
@@ -11876,7 +11873,7 @@
         </p:nvSpPr>
         <p:spPr>
           <a:xfrm>
-            <a:off x="8629983" y="2599189"/>
+            <a:off x="13373038" y="-331408"/>
             <a:ext cx="1479743" cy="305719"/>
           </a:xfrm>
           <a:prstGeom prst="rect">
@@ -11932,7 +11929,7 @@
         </p:nvSpPr>
         <p:spPr>
           <a:xfrm>
-            <a:off x="8629983" y="2976376"/>
+            <a:off x="13373038" y="45779"/>
             <a:ext cx="1479743" cy="305719"/>
           </a:xfrm>
           <a:prstGeom prst="rect">
@@ -11988,7 +11985,7 @@
         </p:nvSpPr>
         <p:spPr>
           <a:xfrm>
-            <a:off x="8629983" y="3342614"/>
+            <a:off x="13373038" y="412017"/>
             <a:ext cx="1479743" cy="305719"/>
           </a:xfrm>
           <a:prstGeom prst="rect">
@@ -12044,7 +12041,7 @@
         </p:nvSpPr>
         <p:spPr>
           <a:xfrm>
-            <a:off x="8629983" y="3718525"/>
+            <a:off x="13373038" y="787928"/>
             <a:ext cx="1479742" cy="305719"/>
           </a:xfrm>
           <a:prstGeom prst="rect">
@@ -12103,7 +12100,7 @@
         </p:nvSpPr>
         <p:spPr>
           <a:xfrm>
-            <a:off x="8629982" y="4082532"/>
+            <a:off x="13373037" y="1151935"/>
             <a:ext cx="1479741" cy="305719"/>
           </a:xfrm>
           <a:prstGeom prst="rect">
@@ -12162,7 +12159,7 @@
         </p:nvSpPr>
         <p:spPr>
           <a:xfrm>
-            <a:off x="7616633" y="3718525"/>
+            <a:off x="12359688" y="787928"/>
             <a:ext cx="914400" cy="305719"/>
           </a:xfrm>
           <a:prstGeom prst="rect">
@@ -12226,7 +12223,7 @@
         </p:nvSpPr>
         <p:spPr>
           <a:xfrm>
-            <a:off x="7616633" y="4082531"/>
+            <a:off x="12359688" y="1151934"/>
             <a:ext cx="914400" cy="305719"/>
           </a:xfrm>
           <a:prstGeom prst="rect">
@@ -12290,7 +12287,7 @@
         </p:nvSpPr>
         <p:spPr>
           <a:xfrm>
-            <a:off x="7616633" y="4458442"/>
+            <a:off x="12359688" y="1527845"/>
             <a:ext cx="914400" cy="305719"/>
           </a:xfrm>
           <a:prstGeom prst="rect">
@@ -12354,7 +12351,7 @@
         </p:nvSpPr>
         <p:spPr>
           <a:xfrm>
-            <a:off x="8629982" y="4458442"/>
+            <a:off x="13373037" y="1527845"/>
             <a:ext cx="1479741" cy="305719"/>
           </a:xfrm>
           <a:prstGeom prst="rect">
@@ -12952,10 +12949,7 @@
               </a:avLst>
             </a:prstGeom>
             <a:solidFill>
-              <a:schemeClr val="tx1">
-                <a:lumMod val="75000"/>
-                <a:lumOff val="25000"/>
-              </a:schemeClr>
+              <a:srgbClr val="C00000"/>
             </a:solidFill>
             <a:ln>
               <a:solidFill>
@@ -12995,6 +12989,379 @@
           </p:txBody>
         </p:sp>
       </p:grpSp>
+      <p:sp>
+        <p:nvSpPr>
+          <p:cNvPr id="20" name="사각형: 둥근 모서리 19">
+            <a:extLst>
+              <a:ext uri="{FF2B5EF4-FFF2-40B4-BE49-F238E27FC236}">
+                <a16:creationId xmlns:a16="http://schemas.microsoft.com/office/drawing/2014/main" id="{31D3FA86-6069-7569-CD87-8F8B802E5831}"/>
+              </a:ext>
+            </a:extLst>
+          </p:cNvPr>
+          <p:cNvSpPr/>
+          <p:nvPr/>
+        </p:nvSpPr>
+        <p:spPr>
+          <a:xfrm>
+            <a:off x="10520050" y="-655788"/>
+            <a:ext cx="1552575" cy="590550"/>
+          </a:xfrm>
+          <a:prstGeom prst="roundRect">
+            <a:avLst/>
+          </a:prstGeom>
+          <a:noFill/>
+          <a:ln w="38100">
+            <a:solidFill>
+              <a:srgbClr val="0CB8DA"/>
+            </a:solidFill>
+          </a:ln>
+        </p:spPr>
+        <p:style>
+          <a:lnRef idx="2">
+            <a:schemeClr val="accent1">
+              <a:shade val="15000"/>
+            </a:schemeClr>
+          </a:lnRef>
+          <a:fillRef idx="1">
+            <a:schemeClr val="accent1"/>
+          </a:fillRef>
+          <a:effectRef idx="0">
+            <a:schemeClr val="accent1"/>
+          </a:effectRef>
+          <a:fontRef idx="minor">
+            <a:schemeClr val="lt1"/>
+          </a:fontRef>
+        </p:style>
+        <p:txBody>
+          <a:bodyPr lIns="0" tIns="0" rIns="0" bIns="0" rtlCol="0" anchor="ctr"/>
+          <a:lstStyle/>
+          <a:p>
+            <a:pPr algn="ctr"/>
+            <a:r>
+              <a:rPr lang="ko-KR" altLang="en-US" sz="1600" spc="-300" dirty="0">
+                <a:solidFill>
+                  <a:srgbClr val="0CB8DA"/>
+                </a:solidFill>
+                <a:latin typeface="나눔스퀘어 Bold" panose="020B0600000101010101" pitchFamily="50" charset="-127"/>
+                <a:ea typeface="나눔스퀘어 Bold" panose="020B0600000101010101" pitchFamily="50" charset="-127"/>
+              </a:rPr>
+              <a:t>▶▶</a:t>
+            </a:r>
+            <a:r>
+              <a:rPr lang="ko-KR" altLang="en-US" sz="1600" dirty="0">
+                <a:solidFill>
+                  <a:srgbClr val="0CB8DA"/>
+                </a:solidFill>
+                <a:latin typeface="나눔스퀘어 Bold" panose="020B0600000101010101" pitchFamily="50" charset="-127"/>
+                <a:ea typeface="나눔스퀘어 Bold" panose="020B0600000101010101" pitchFamily="50" charset="-127"/>
+              </a:rPr>
+              <a:t> </a:t>
+            </a:r>
+            <a:r>
+              <a:rPr lang="ko-KR" altLang="en-US" sz="1600" spc="-300" dirty="0">
+                <a:solidFill>
+                  <a:srgbClr val="0CB8DA"/>
+                </a:solidFill>
+                <a:latin typeface="나눔스퀘어 Bold" panose="020B0600000101010101" pitchFamily="50" charset="-127"/>
+                <a:ea typeface="나눔스퀘어 Bold" panose="020B0600000101010101" pitchFamily="50" charset="-127"/>
+              </a:rPr>
+              <a:t> </a:t>
+            </a:r>
+            <a:r>
+              <a:rPr lang="ko-KR" altLang="en-US" sz="1600" dirty="0">
+                <a:solidFill>
+                  <a:srgbClr val="0CB8DA"/>
+                </a:solidFill>
+                <a:latin typeface="나눔스퀘어 Bold" panose="020B0600000101010101" pitchFamily="50" charset="-127"/>
+                <a:ea typeface="나눔스퀘어 Bold" panose="020B0600000101010101" pitchFamily="50" charset="-127"/>
+              </a:rPr>
+              <a:t>빠른 시작</a:t>
+            </a:r>
+            <a:endParaRPr lang="ko-KR" altLang="en-US" sz="1600" spc="-300" dirty="0">
+              <a:solidFill>
+                <a:srgbClr val="0CB8DA"/>
+              </a:solidFill>
+              <a:latin typeface="나눔스퀘어 Bold" panose="020B0600000101010101" pitchFamily="50" charset="-127"/>
+              <a:ea typeface="나눔스퀘어 Bold" panose="020B0600000101010101" pitchFamily="50" charset="-127"/>
+            </a:endParaRPr>
+          </a:p>
+        </p:txBody>
+      </p:sp>
+      <p:sp>
+        <p:nvSpPr>
+          <p:cNvPr id="25" name="사각형: 둥근 모서리 24">
+            <a:extLst>
+              <a:ext uri="{FF2B5EF4-FFF2-40B4-BE49-F238E27FC236}">
+                <a16:creationId xmlns:a16="http://schemas.microsoft.com/office/drawing/2014/main" id="{14B2DE05-5BEC-A619-1825-0263BFE783B6}"/>
+              </a:ext>
+            </a:extLst>
+          </p:cNvPr>
+          <p:cNvSpPr/>
+          <p:nvPr/>
+        </p:nvSpPr>
+        <p:spPr>
+          <a:xfrm>
+            <a:off x="8529997" y="-1280486"/>
+            <a:ext cx="1552575" cy="590550"/>
+          </a:xfrm>
+          <a:prstGeom prst="roundRect">
+            <a:avLst/>
+          </a:prstGeom>
+          <a:noFill/>
+          <a:ln w="38100">
+            <a:solidFill>
+              <a:schemeClr val="tx1">
+                <a:lumMod val="50000"/>
+                <a:lumOff val="50000"/>
+              </a:schemeClr>
+            </a:solidFill>
+          </a:ln>
+        </p:spPr>
+        <p:style>
+          <a:lnRef idx="2">
+            <a:schemeClr val="accent1">
+              <a:shade val="15000"/>
+            </a:schemeClr>
+          </a:lnRef>
+          <a:fillRef idx="1">
+            <a:schemeClr val="accent1"/>
+          </a:fillRef>
+          <a:effectRef idx="0">
+            <a:schemeClr val="accent1"/>
+          </a:effectRef>
+          <a:fontRef idx="minor">
+            <a:schemeClr val="lt1"/>
+          </a:fontRef>
+        </p:style>
+        <p:txBody>
+          <a:bodyPr lIns="0" tIns="0" rIns="0" bIns="0" rtlCol="0" anchor="ctr"/>
+          <a:lstStyle/>
+          <a:p>
+            <a:pPr algn="ctr"/>
+            <a:r>
+              <a:rPr lang="ko-KR" altLang="en-US" sz="1600" dirty="0">
+                <a:solidFill>
+                  <a:schemeClr val="tx1">
+                    <a:lumMod val="50000"/>
+                    <a:lumOff val="50000"/>
+                  </a:schemeClr>
+                </a:solidFill>
+                <a:latin typeface="나눔스퀘어 Bold" panose="020B0600000101010101" pitchFamily="50" charset="-127"/>
+                <a:ea typeface="나눔스퀘어 Bold" panose="020B0600000101010101" pitchFamily="50" charset="-127"/>
+              </a:rPr>
+              <a:t>방 만들기</a:t>
+            </a:r>
+          </a:p>
+        </p:txBody>
+      </p:sp>
+      <p:sp>
+        <p:nvSpPr>
+          <p:cNvPr id="1121" name="TextBox 1120">
+            <a:extLst>
+              <a:ext uri="{FF2B5EF4-FFF2-40B4-BE49-F238E27FC236}">
+                <a16:creationId xmlns:a16="http://schemas.microsoft.com/office/drawing/2014/main" id="{1DEC0A14-626C-71D4-A103-3791727DA76E}"/>
+              </a:ext>
+            </a:extLst>
+          </p:cNvPr>
+          <p:cNvSpPr txBox="1"/>
+          <p:nvPr/>
+        </p:nvSpPr>
+        <p:spPr>
+          <a:xfrm>
+            <a:off x="11278336" y="1193384"/>
+            <a:ext cx="202544" cy="276999"/>
+          </a:xfrm>
+          <a:prstGeom prst="rect">
+            <a:avLst/>
+          </a:prstGeom>
+          <a:noFill/>
+          <a:ln>
+            <a:solidFill>
+              <a:schemeClr val="tx1"/>
+            </a:solidFill>
+          </a:ln>
+        </p:spPr>
+        <p:txBody>
+          <a:bodyPr wrap="square" lIns="0" tIns="0" rIns="0" bIns="0" anchor="ctr" anchorCtr="0">
+            <a:spAutoFit/>
+          </a:bodyPr>
+          <a:lstStyle/>
+          <a:p>
+            <a:r>
+              <a:rPr lang="ko-KR" altLang="en-US" sz="1800" b="1" spc="-300" dirty="0">
+                <a:solidFill>
+                  <a:schemeClr val="accent5">
+                    <a:lumMod val="60000"/>
+                    <a:lumOff val="40000"/>
+                  </a:schemeClr>
+                </a:solidFill>
+                <a:latin typeface="나눔스퀘어 Bold" panose="020B0600000101010101" pitchFamily="50" charset="-127"/>
+                <a:ea typeface="나눔스퀘어 Bold" panose="020B0600000101010101" pitchFamily="50" charset="-127"/>
+              </a:rPr>
+              <a:t>▶</a:t>
+            </a:r>
+            <a:endParaRPr lang="ko-KR" altLang="en-US" b="1" dirty="0">
+              <a:solidFill>
+                <a:schemeClr val="accent5">
+                  <a:lumMod val="60000"/>
+                  <a:lumOff val="40000"/>
+                </a:schemeClr>
+              </a:solidFill>
+            </a:endParaRPr>
+          </a:p>
+        </p:txBody>
+      </p:sp>
+      <p:sp>
+        <p:nvSpPr>
+          <p:cNvPr id="1122" name="TextBox 1121">
+            <a:extLst>
+              <a:ext uri="{FF2B5EF4-FFF2-40B4-BE49-F238E27FC236}">
+                <a16:creationId xmlns:a16="http://schemas.microsoft.com/office/drawing/2014/main" id="{C4B33F3C-19AF-B538-04CA-AA68DC64BF1F}"/>
+              </a:ext>
+            </a:extLst>
+          </p:cNvPr>
+          <p:cNvSpPr txBox="1"/>
+          <p:nvPr/>
+        </p:nvSpPr>
+        <p:spPr>
+          <a:xfrm>
+            <a:off x="10913132" y="1193385"/>
+            <a:ext cx="202544" cy="276999"/>
+          </a:xfrm>
+          <a:prstGeom prst="rect">
+            <a:avLst/>
+          </a:prstGeom>
+          <a:noFill/>
+          <a:ln>
+            <a:solidFill>
+              <a:schemeClr val="tx1"/>
+            </a:solidFill>
+          </a:ln>
+        </p:spPr>
+        <p:txBody>
+          <a:bodyPr wrap="square" lIns="0" tIns="0" rIns="0" bIns="0" anchor="ctr" anchorCtr="0">
+            <a:spAutoFit/>
+          </a:bodyPr>
+          <a:lstStyle/>
+          <a:p>
+            <a:r>
+              <a:rPr lang="ko-KR" altLang="en-US" sz="1800" b="1" spc="-300" dirty="0">
+                <a:solidFill>
+                  <a:schemeClr val="accent5">
+                    <a:lumMod val="60000"/>
+                    <a:lumOff val="40000"/>
+                  </a:schemeClr>
+                </a:solidFill>
+                <a:latin typeface="나눔스퀘어 Bold" panose="020B0600000101010101" pitchFamily="50" charset="-127"/>
+                <a:ea typeface="나눔스퀘어 Bold" panose="020B0600000101010101" pitchFamily="50" charset="-127"/>
+              </a:rPr>
+              <a:t>◀</a:t>
+            </a:r>
+            <a:endParaRPr lang="ko-KR" altLang="en-US" b="1" dirty="0">
+              <a:solidFill>
+                <a:schemeClr val="accent5">
+                  <a:lumMod val="60000"/>
+                  <a:lumOff val="40000"/>
+                </a:schemeClr>
+              </a:solidFill>
+            </a:endParaRPr>
+          </a:p>
+        </p:txBody>
+      </p:sp>
+      <p:sp>
+        <p:nvSpPr>
+          <p:cNvPr id="1123" name="TextBox 1122">
+            <a:extLst>
+              <a:ext uri="{FF2B5EF4-FFF2-40B4-BE49-F238E27FC236}">
+                <a16:creationId xmlns:a16="http://schemas.microsoft.com/office/drawing/2014/main" id="{D31280C6-72BC-9E48-9D54-119FBF66F9D3}"/>
+              </a:ext>
+            </a:extLst>
+          </p:cNvPr>
+          <p:cNvSpPr txBox="1"/>
+          <p:nvPr/>
+        </p:nvSpPr>
+        <p:spPr>
+          <a:xfrm>
+            <a:off x="10913132" y="1471631"/>
+            <a:ext cx="202544" cy="276999"/>
+          </a:xfrm>
+          <a:prstGeom prst="rect">
+            <a:avLst/>
+          </a:prstGeom>
+          <a:noFill/>
+          <a:ln>
+            <a:solidFill>
+              <a:schemeClr val="tx1"/>
+            </a:solidFill>
+          </a:ln>
+        </p:spPr>
+        <p:txBody>
+          <a:bodyPr wrap="square" lIns="0" tIns="0" rIns="0" bIns="0" anchor="ctr" anchorCtr="0">
+            <a:spAutoFit/>
+          </a:bodyPr>
+          <a:lstStyle/>
+          <a:p>
+            <a:r>
+              <a:rPr lang="ko-KR" altLang="en-US" sz="1800" b="1" spc="-300" dirty="0">
+                <a:solidFill>
+                  <a:srgbClr val="0CB8DA"/>
+                </a:solidFill>
+                <a:latin typeface="나눔스퀘어 Bold" panose="020B0600000101010101" pitchFamily="50" charset="-127"/>
+                <a:ea typeface="나눔스퀘어 Bold" panose="020B0600000101010101" pitchFamily="50" charset="-127"/>
+              </a:rPr>
+              <a:t>◀</a:t>
+            </a:r>
+            <a:endParaRPr lang="ko-KR" altLang="en-US" b="1" dirty="0"/>
+          </a:p>
+        </p:txBody>
+      </p:sp>
+      <p:sp>
+        <p:nvSpPr>
+          <p:cNvPr id="1125" name="TextBox 1124">
+            <a:extLst>
+              <a:ext uri="{FF2B5EF4-FFF2-40B4-BE49-F238E27FC236}">
+                <a16:creationId xmlns:a16="http://schemas.microsoft.com/office/drawing/2014/main" id="{557D15FD-7F75-89E6-19CF-9A902C68D8D2}"/>
+              </a:ext>
+            </a:extLst>
+          </p:cNvPr>
+          <p:cNvSpPr txBox="1"/>
+          <p:nvPr/>
+        </p:nvSpPr>
+        <p:spPr>
+          <a:xfrm>
+            <a:off x="11278336" y="1474422"/>
+            <a:ext cx="202544" cy="276999"/>
+          </a:xfrm>
+          <a:prstGeom prst="rect">
+            <a:avLst/>
+          </a:prstGeom>
+          <a:noFill/>
+          <a:ln>
+            <a:solidFill>
+              <a:schemeClr val="tx1"/>
+            </a:solidFill>
+          </a:ln>
+        </p:spPr>
+        <p:txBody>
+          <a:bodyPr wrap="square" lIns="0" tIns="0" rIns="0" bIns="0" anchor="ctr" anchorCtr="0">
+            <a:spAutoFit/>
+          </a:bodyPr>
+          <a:lstStyle/>
+          <a:p>
+            <a:r>
+              <a:rPr lang="ko-KR" altLang="en-US" sz="1800" b="1" spc="-300" dirty="0">
+                <a:solidFill>
+                  <a:srgbClr val="0CB8DA"/>
+                </a:solidFill>
+                <a:latin typeface="나눔스퀘어 Bold" panose="020B0600000101010101" pitchFamily="50" charset="-127"/>
+                <a:ea typeface="나눔스퀘어 Bold" panose="020B0600000101010101" pitchFamily="50" charset="-127"/>
+              </a:rPr>
+              <a:t>▶</a:t>
+            </a:r>
+            <a:endParaRPr lang="ko-KR" altLang="en-US" b="1" dirty="0"/>
+          </a:p>
+        </p:txBody>
+      </p:sp>
     </p:spTree>
     <p:extLst>
       <p:ext uri="{BB962C8B-B14F-4D97-AF65-F5344CB8AC3E}">

</xml_diff>

<commit_message>
#07-28 이세철 UI 1차
</commit_message>
<xml_diff>
--- a/Client/PvE/REVENGER/UI/XDUI/UI.pptx
+++ b/Client/PvE/REVENGER/UI/XDUI/UI.pptx
@@ -15,6 +15,7 @@
     <p:sldId id="263" r:id="rId9"/>
     <p:sldId id="264" r:id="rId10"/>
     <p:sldId id="265" r:id="rId11"/>
+    <p:sldId id="266" r:id="rId12"/>
   </p:sldIdLst>
   <p:sldSz cx="12192000" cy="6858000"/>
   <p:notesSz cx="6858000" cy="9144000"/>
@@ -8030,6 +8031,431 @@
 </p:sld>
 </file>
 
+<file path=ppt/slides/slide11.xml><?xml version="1.0" encoding="utf-8"?>
+<p:sld xmlns:a="http://schemas.openxmlformats.org/drawingml/2006/main" xmlns:r="http://schemas.openxmlformats.org/officeDocument/2006/relationships" xmlns:p="http://schemas.openxmlformats.org/presentationml/2006/main">
+  <p:cSld>
+    <p:spTree>
+      <p:nvGrpSpPr>
+        <p:cNvPr id="1" name=""/>
+        <p:cNvGrpSpPr/>
+        <p:nvPr/>
+      </p:nvGrpSpPr>
+      <p:grpSpPr>
+        <a:xfrm>
+          <a:off x="0" y="0"/>
+          <a:ext cx="0" cy="0"/>
+          <a:chOff x="0" y="0"/>
+          <a:chExt cx="0" cy="0"/>
+        </a:xfrm>
+      </p:grpSpPr>
+      <p:pic>
+        <p:nvPicPr>
+          <p:cNvPr id="16" name="그림 15">
+            <a:extLst>
+              <a:ext uri="{FF2B5EF4-FFF2-40B4-BE49-F238E27FC236}">
+                <a16:creationId xmlns:a16="http://schemas.microsoft.com/office/drawing/2014/main" id="{2CD6BF28-5C97-901C-AA90-E9495E65A91D}"/>
+              </a:ext>
+            </a:extLst>
+          </p:cNvPr>
+          <p:cNvPicPr>
+            <a:picLocks noChangeAspect="1"/>
+          </p:cNvPicPr>
+          <p:nvPr/>
+        </p:nvPicPr>
+        <p:blipFill>
+          <a:blip r:embed="rId2">
+            <a:extLst>
+              <a:ext uri="{28A0092B-C50C-407E-A947-70E740481C1C}">
+                <a14:useLocalDpi xmlns:a14="http://schemas.microsoft.com/office/drawing/2010/main" val="0"/>
+              </a:ext>
+            </a:extLst>
+          </a:blip>
+          <a:stretch>
+            <a:fillRect/>
+          </a:stretch>
+        </p:blipFill>
+        <p:spPr>
+          <a:xfrm>
+            <a:off x="0" y="754923"/>
+            <a:ext cx="12192000" cy="1996599"/>
+          </a:xfrm>
+          <a:prstGeom prst="rect">
+            <a:avLst/>
+          </a:prstGeom>
+        </p:spPr>
+      </p:pic>
+      <p:pic>
+        <p:nvPicPr>
+          <p:cNvPr id="12" name="그림 11">
+            <a:extLst>
+              <a:ext uri="{FF2B5EF4-FFF2-40B4-BE49-F238E27FC236}">
+                <a16:creationId xmlns:a16="http://schemas.microsoft.com/office/drawing/2014/main" id="{A230383D-11D8-9C9C-4091-7F5DD519B87D}"/>
+              </a:ext>
+            </a:extLst>
+          </p:cNvPr>
+          <p:cNvPicPr>
+            <a:picLocks noChangeAspect="1"/>
+          </p:cNvPicPr>
+          <p:nvPr/>
+        </p:nvPicPr>
+        <p:blipFill>
+          <a:blip r:embed="rId3">
+            <a:extLst>
+              <a:ext uri="{28A0092B-C50C-407E-A947-70E740481C1C}">
+                <a14:useLocalDpi xmlns:a14="http://schemas.microsoft.com/office/drawing/2010/main" val="0"/>
+              </a:ext>
+            </a:extLst>
+          </a:blip>
+          <a:stretch>
+            <a:fillRect/>
+          </a:stretch>
+        </p:blipFill>
+        <p:spPr>
+          <a:xfrm>
+            <a:off x="3541554" y="810561"/>
+            <a:ext cx="5108891" cy="1072989"/>
+          </a:xfrm>
+          <a:prstGeom prst="rect">
+            <a:avLst/>
+          </a:prstGeom>
+        </p:spPr>
+      </p:pic>
+      <p:pic>
+        <p:nvPicPr>
+          <p:cNvPr id="31" name="그림 30">
+            <a:extLst>
+              <a:ext uri="{FF2B5EF4-FFF2-40B4-BE49-F238E27FC236}">
+                <a16:creationId xmlns:a16="http://schemas.microsoft.com/office/drawing/2014/main" id="{502180E0-0C69-A70C-7DFA-47485190C68B}"/>
+              </a:ext>
+            </a:extLst>
+          </p:cNvPr>
+          <p:cNvPicPr>
+            <a:picLocks noChangeAspect="1"/>
+          </p:cNvPicPr>
+          <p:nvPr/>
+        </p:nvPicPr>
+        <p:blipFill>
+          <a:blip r:embed="rId4">
+            <a:extLst>
+              <a:ext uri="{28A0092B-C50C-407E-A947-70E740481C1C}">
+                <a14:useLocalDpi xmlns:a14="http://schemas.microsoft.com/office/drawing/2010/main" val="0"/>
+              </a:ext>
+            </a:extLst>
+          </a:blip>
+          <a:stretch>
+            <a:fillRect/>
+          </a:stretch>
+        </p:blipFill>
+        <p:spPr>
+          <a:xfrm>
+            <a:off x="0" y="3701332"/>
+            <a:ext cx="12192000" cy="2222247"/>
+          </a:xfrm>
+          <a:prstGeom prst="rect">
+            <a:avLst/>
+          </a:prstGeom>
+        </p:spPr>
+      </p:pic>
+      <p:pic>
+        <p:nvPicPr>
+          <p:cNvPr id="35" name="그림 34">
+            <a:extLst>
+              <a:ext uri="{FF2B5EF4-FFF2-40B4-BE49-F238E27FC236}">
+                <a16:creationId xmlns:a16="http://schemas.microsoft.com/office/drawing/2014/main" id="{AA7832F1-6E5B-2507-39FA-E815D809F61D}"/>
+              </a:ext>
+            </a:extLst>
+          </p:cNvPr>
+          <p:cNvPicPr>
+            <a:picLocks noChangeAspect="1"/>
+          </p:cNvPicPr>
+          <p:nvPr/>
+        </p:nvPicPr>
+        <p:blipFill>
+          <a:blip r:embed="rId5">
+            <a:extLst>
+              <a:ext uri="{28A0092B-C50C-407E-A947-70E740481C1C}">
+                <a14:useLocalDpi xmlns:a14="http://schemas.microsoft.com/office/drawing/2010/main" val="0"/>
+              </a:ext>
+            </a:extLst>
+          </a:blip>
+          <a:stretch>
+            <a:fillRect/>
+          </a:stretch>
+        </p:blipFill>
+        <p:spPr>
+          <a:xfrm>
+            <a:off x="3977455" y="3771002"/>
+            <a:ext cx="4237087" cy="1072989"/>
+          </a:xfrm>
+          <a:prstGeom prst="rect">
+            <a:avLst/>
+          </a:prstGeom>
+        </p:spPr>
+      </p:pic>
+      <p:pic>
+        <p:nvPicPr>
+          <p:cNvPr id="4" name="그림 3">
+            <a:extLst>
+              <a:ext uri="{FF2B5EF4-FFF2-40B4-BE49-F238E27FC236}">
+                <a16:creationId xmlns:a16="http://schemas.microsoft.com/office/drawing/2014/main" id="{9AA1425E-456C-765B-8AEA-6C2D1FCA7AA3}"/>
+              </a:ext>
+            </a:extLst>
+          </p:cNvPr>
+          <p:cNvPicPr>
+            <a:picLocks noChangeAspect="1"/>
+          </p:cNvPicPr>
+          <p:nvPr/>
+        </p:nvPicPr>
+        <p:blipFill>
+          <a:blip r:embed="rId6">
+            <a:extLst>
+              <a:ext uri="{28A0092B-C50C-407E-A947-70E740481C1C}">
+                <a14:useLocalDpi xmlns:a14="http://schemas.microsoft.com/office/drawing/2010/main" val="0"/>
+              </a:ext>
+            </a:extLst>
+          </a:blip>
+          <a:stretch>
+            <a:fillRect/>
+          </a:stretch>
+        </p:blipFill>
+        <p:spPr>
+          <a:xfrm>
+            <a:off x="3663483" y="1760371"/>
+            <a:ext cx="4865030" cy="1072989"/>
+          </a:xfrm>
+          <a:prstGeom prst="rect">
+            <a:avLst/>
+          </a:prstGeom>
+        </p:spPr>
+      </p:pic>
+      <p:sp>
+        <p:nvSpPr>
+          <p:cNvPr id="5" name="Rectangle 2">
+            <a:extLst>
+              <a:ext uri="{FF2B5EF4-FFF2-40B4-BE49-F238E27FC236}">
+                <a16:creationId xmlns:a16="http://schemas.microsoft.com/office/drawing/2014/main" id="{69C9666B-EE2C-5BC8-D053-7AD780C6AED3}"/>
+              </a:ext>
+            </a:extLst>
+          </p:cNvPr>
+          <p:cNvSpPr>
+            <a:spLocks noChangeArrowheads="1"/>
+          </p:cNvSpPr>
+          <p:nvPr/>
+        </p:nvSpPr>
+        <p:spPr bwMode="auto">
+          <a:xfrm>
+            <a:off x="3064721" y="-66357"/>
+            <a:ext cx="6062558" cy="589913"/>
+          </a:xfrm>
+          <a:prstGeom prst="rect">
+            <a:avLst/>
+          </a:prstGeom>
+          <a:solidFill>
+            <a:srgbClr val="303134"/>
+          </a:solidFill>
+          <a:ln>
+            <a:noFill/>
+          </a:ln>
+          <a:effectLst/>
+          <a:extLst>
+            <a:ext uri="{91240B29-F687-4F45-9708-019B960494DF}">
+              <a14:hiddenLine xmlns:a14="http://schemas.microsoft.com/office/drawing/2010/main" w="9525">
+                <a:solidFill>
+                  <a:schemeClr val="tx1"/>
+                </a:solidFill>
+                <a:miter lim="800000"/>
+                <a:headEnd/>
+                <a:tailEnd/>
+              </a14:hiddenLine>
+            </a:ext>
+            <a:ext uri="{AF507438-7753-43E0-B8FC-AC1667EBCBE1}">
+              <a14:hiddenEffects xmlns:a14="http://schemas.microsoft.com/office/drawing/2010/main">
+                <a:effectLst>
+                  <a:outerShdw dist="35921" dir="2700000" algn="ctr" rotWithShape="0">
+                    <a:schemeClr val="bg2"/>
+                  </a:outerShdw>
+                </a:effectLst>
+              </a14:hiddenEffects>
+            </a:ext>
+          </a:extLst>
+        </p:spPr>
+        <p:txBody>
+          <a:bodyPr vert="horz" wrap="none" lIns="0" tIns="-12696" rIns="0" bIns="-12696" numCol="1" anchor="ctr" anchorCtr="0" compatLnSpc="1">
+            <a:prstTxWarp prst="textNoShape">
+              <a:avLst/>
+            </a:prstTxWarp>
+            <a:spAutoFit/>
+          </a:bodyPr>
+          <a:lstStyle/>
+          <a:p>
+            <a:pPr marR="0" lvl="0" indent="0" algn="ctr" fontAlgn="base">
+              <a:lnSpc>
+                <a:spcPct val="100000"/>
+              </a:lnSpc>
+              <a:spcBef>
+                <a:spcPct val="0"/>
+              </a:spcBef>
+              <a:spcAft>
+                <a:spcPct val="0"/>
+              </a:spcAft>
+              <a:buClrTx/>
+              <a:buSzTx/>
+              <a:buFontTx/>
+              <a:buNone/>
+              <a:tabLst/>
+            </a:pPr>
+            <a:r>
+              <a:rPr lang="ko-KR" altLang="ko-KR" sz="4000" dirty="0" err="1">
+                <a:solidFill>
+                  <a:schemeClr val="bg1"/>
+                </a:solidFill>
+                <a:latin typeface="DS-Digital" pitchFamily="2" charset="0"/>
+                <a:ea typeface="나눔스퀘어 ExtraBold" panose="020B0600000101010101" pitchFamily="50" charset="-127"/>
+              </a:rPr>
+              <a:t>you've</a:t>
+            </a:r>
+            <a:r>
+              <a:rPr lang="ko-KR" altLang="ko-KR" sz="4000" dirty="0">
+                <a:solidFill>
+                  <a:schemeClr val="bg1"/>
+                </a:solidFill>
+                <a:latin typeface="DS-Digital" pitchFamily="2" charset="0"/>
+                <a:ea typeface="나눔스퀘어 ExtraBold" panose="020B0600000101010101" pitchFamily="50" charset="-127"/>
+              </a:rPr>
+              <a:t> </a:t>
+            </a:r>
+            <a:r>
+              <a:rPr lang="ko-KR" altLang="ko-KR" sz="4000" dirty="0" err="1">
+                <a:solidFill>
+                  <a:schemeClr val="bg1"/>
+                </a:solidFill>
+                <a:latin typeface="DS-Digital" pitchFamily="2" charset="0"/>
+                <a:ea typeface="나눔스퀘어 ExtraBold" panose="020B0600000101010101" pitchFamily="50" charset="-127"/>
+              </a:rPr>
+              <a:t>spent</a:t>
+            </a:r>
+            <a:r>
+              <a:rPr lang="ko-KR" altLang="ko-KR" sz="4000" dirty="0">
+                <a:solidFill>
+                  <a:schemeClr val="bg1"/>
+                </a:solidFill>
+                <a:latin typeface="DS-Digital" pitchFamily="2" charset="0"/>
+                <a:ea typeface="나눔스퀘어 ExtraBold" panose="020B0600000101010101" pitchFamily="50" charset="-127"/>
+              </a:rPr>
+              <a:t> </a:t>
+            </a:r>
+            <a:r>
+              <a:rPr lang="ko-KR" altLang="ko-KR" sz="4000" dirty="0" err="1">
+                <a:solidFill>
+                  <a:schemeClr val="bg1"/>
+                </a:solidFill>
+                <a:latin typeface="DS-Digital" pitchFamily="2" charset="0"/>
+                <a:ea typeface="나눔스퀘어 ExtraBold" panose="020B0600000101010101" pitchFamily="50" charset="-127"/>
+              </a:rPr>
+              <a:t>all</a:t>
+            </a:r>
+            <a:r>
+              <a:rPr lang="ko-KR" altLang="ko-KR" sz="4000" dirty="0">
+                <a:solidFill>
+                  <a:schemeClr val="bg1"/>
+                </a:solidFill>
+                <a:latin typeface="DS-Digital" pitchFamily="2" charset="0"/>
+                <a:ea typeface="나눔스퀘어 ExtraBold" panose="020B0600000101010101" pitchFamily="50" charset="-127"/>
+              </a:rPr>
+              <a:t> </a:t>
+            </a:r>
+            <a:r>
+              <a:rPr lang="ko-KR" altLang="ko-KR" sz="4000" dirty="0" err="1">
+                <a:solidFill>
+                  <a:schemeClr val="bg1"/>
+                </a:solidFill>
+                <a:latin typeface="DS-Digital" pitchFamily="2" charset="0"/>
+                <a:ea typeface="나눔스퀘어 ExtraBold" panose="020B0600000101010101" pitchFamily="50" charset="-127"/>
+              </a:rPr>
+              <a:t>your</a:t>
+            </a:r>
+            <a:r>
+              <a:rPr lang="ko-KR" altLang="ko-KR" sz="4000" dirty="0">
+                <a:solidFill>
+                  <a:schemeClr val="bg1"/>
+                </a:solidFill>
+                <a:latin typeface="DS-Digital" pitchFamily="2" charset="0"/>
+                <a:ea typeface="나눔스퀘어 ExtraBold" panose="020B0600000101010101" pitchFamily="50" charset="-127"/>
+              </a:rPr>
+              <a:t> </a:t>
+            </a:r>
+            <a:r>
+              <a:rPr lang="ko-KR" altLang="ko-KR" sz="4000" dirty="0" err="1">
+                <a:solidFill>
+                  <a:schemeClr val="bg1"/>
+                </a:solidFill>
+                <a:latin typeface="DS-Digital" pitchFamily="2" charset="0"/>
+                <a:ea typeface="나눔스퀘어 ExtraBold" panose="020B0600000101010101" pitchFamily="50" charset="-127"/>
+              </a:rPr>
+              <a:t>life</a:t>
+            </a:r>
+            <a:r>
+              <a:rPr lang="ko-KR" altLang="ko-KR" sz="4000" dirty="0">
+                <a:solidFill>
+                  <a:schemeClr val="bg1"/>
+                </a:solidFill>
+                <a:latin typeface="DS-Digital" pitchFamily="2" charset="0"/>
+                <a:ea typeface="나눔스퀘어 ExtraBold" panose="020B0600000101010101" pitchFamily="50" charset="-127"/>
+              </a:rPr>
+              <a:t> </a:t>
+            </a:r>
+          </a:p>
+        </p:txBody>
+      </p:sp>
+      <p:pic>
+        <p:nvPicPr>
+          <p:cNvPr id="7" name="그림 6">
+            <a:extLst>
+              <a:ext uri="{FF2B5EF4-FFF2-40B4-BE49-F238E27FC236}">
+                <a16:creationId xmlns:a16="http://schemas.microsoft.com/office/drawing/2014/main" id="{18AEB186-3AFA-AE38-949B-3C9FD33AB013}"/>
+              </a:ext>
+            </a:extLst>
+          </p:cNvPr>
+          <p:cNvPicPr>
+            <a:picLocks noChangeAspect="1"/>
+          </p:cNvPicPr>
+          <p:nvPr/>
+        </p:nvPicPr>
+        <p:blipFill>
+          <a:blip r:embed="rId7">
+            <a:extLst>
+              <a:ext uri="{28A0092B-C50C-407E-A947-70E740481C1C}">
+                <a14:useLocalDpi xmlns:a14="http://schemas.microsoft.com/office/drawing/2010/main" val="0"/>
+              </a:ext>
+            </a:extLst>
+          </a:blip>
+          <a:stretch>
+            <a:fillRect/>
+          </a:stretch>
+        </p:blipFill>
+        <p:spPr>
+          <a:xfrm>
+            <a:off x="2480756" y="4850590"/>
+            <a:ext cx="7230483" cy="1072989"/>
+          </a:xfrm>
+          <a:prstGeom prst="rect">
+            <a:avLst/>
+          </a:prstGeom>
+        </p:spPr>
+      </p:pic>
+    </p:spTree>
+    <p:extLst>
+      <p:ext uri="{BB962C8B-B14F-4D97-AF65-F5344CB8AC3E}">
+        <p14:creationId xmlns:p14="http://schemas.microsoft.com/office/powerpoint/2010/main" val="3815833540"/>
+      </p:ext>
+    </p:extLst>
+  </p:cSld>
+  <p:clrMapOvr>
+    <a:masterClrMapping/>
+  </p:clrMapOvr>
+</p:sld>
+</file>
+
 <file path=ppt/slides/slide2.xml><?xml version="1.0" encoding="utf-8"?>
 <p:sld xmlns:a="http://schemas.openxmlformats.org/drawingml/2006/main" xmlns:r="http://schemas.openxmlformats.org/officeDocument/2006/relationships" xmlns:p="http://schemas.openxmlformats.org/presentationml/2006/main">
   <p:cSld>

</xml_diff>